<commit_message>
Start Scene UI 조정중...
</commit_message>
<xml_diff>
--- a/Hextris 아트 리소스.pptx
+++ b/Hextris 아트 리소스.pptx
@@ -7423,7 +7423,7 @@
             <a:lstStyle/>
             <a:p>
               <a:pPr algn="ctr"/>
-              <a:endParaRPr lang="ko-KR" altLang="en-US"/>
+              <a:endParaRPr lang="ko-KR" altLang="en-US" dirty="0"/>
             </a:p>
           </p:txBody>
         </p:sp>
@@ -7933,6 +7933,528 @@
                 </a:gs>
                 <a:gs pos="100000">
                   <a:srgbClr val="FFFF9B"/>
+                </a:gs>
+              </a:gsLst>
+              <a:lin ang="5400000" scaled="1"/>
+              <a:tileRect/>
+            </a:gradFill>
+            <a:ln>
+              <a:noFill/>
+            </a:ln>
+          </p:spPr>
+          <p:style>
+            <a:lnRef idx="2">
+              <a:schemeClr val="accent1">
+                <a:shade val="50000"/>
+              </a:schemeClr>
+            </a:lnRef>
+            <a:fillRef idx="1">
+              <a:schemeClr val="accent1"/>
+            </a:fillRef>
+            <a:effectRef idx="0">
+              <a:schemeClr val="accent1"/>
+            </a:effectRef>
+            <a:fontRef idx="minor">
+              <a:schemeClr val="lt1"/>
+            </a:fontRef>
+          </p:style>
+          <p:txBody>
+            <a:bodyPr rtlCol="0" anchor="ctr"/>
+            <a:lstStyle/>
+            <a:p>
+              <a:pPr algn="ctr"/>
+              <a:endParaRPr lang="ko-KR" altLang="en-US"/>
+            </a:p>
+          </p:txBody>
+        </p:sp>
+      </p:grpSp>
+      <p:grpSp>
+        <p:nvGrpSpPr>
+          <p:cNvPr id="2" name="그룹 1"/>
+          <p:cNvGrpSpPr/>
+          <p:nvPr/>
+        </p:nvGrpSpPr>
+        <p:grpSpPr>
+          <a:xfrm>
+            <a:off x="6804545" y="252872"/>
+            <a:ext cx="5469620" cy="5386090"/>
+            <a:chOff x="6804545" y="252872"/>
+            <a:chExt cx="5469620" cy="5386090"/>
+          </a:xfrm>
+        </p:grpSpPr>
+        <p:sp>
+          <p:nvSpPr>
+            <p:cNvPr id="28" name="육각형 27"/>
+            <p:cNvSpPr>
+              <a:spLocks noChangeAspect="1"/>
+            </p:cNvSpPr>
+            <p:nvPr/>
+          </p:nvSpPr>
+          <p:spPr>
+            <a:xfrm>
+              <a:off x="6804545" y="736477"/>
+              <a:ext cx="5469620" cy="4682136"/>
+            </a:xfrm>
+            <a:prstGeom prst="hexagon">
+              <a:avLst>
+                <a:gd name="adj" fmla="val 28379"/>
+                <a:gd name="vf" fmla="val 115470"/>
+              </a:avLst>
+            </a:prstGeom>
+            <a:solidFill>
+              <a:srgbClr val="DCDCDC"/>
+            </a:solidFill>
+            <a:ln w="635000">
+              <a:noFill/>
+            </a:ln>
+          </p:spPr>
+          <p:style>
+            <a:lnRef idx="2">
+              <a:schemeClr val="accent1">
+                <a:shade val="50000"/>
+              </a:schemeClr>
+            </a:lnRef>
+            <a:fillRef idx="1">
+              <a:schemeClr val="accent1"/>
+            </a:fillRef>
+            <a:effectRef idx="0">
+              <a:schemeClr val="accent1"/>
+            </a:effectRef>
+            <a:fontRef idx="minor">
+              <a:schemeClr val="lt1"/>
+            </a:fontRef>
+          </p:style>
+          <p:txBody>
+            <a:bodyPr rtlCol="0" anchor="ctr"/>
+            <a:lstStyle/>
+            <a:p>
+              <a:pPr algn="ctr"/>
+              <a:endParaRPr lang="ko-KR" altLang="en-US"/>
+            </a:p>
+          </p:txBody>
+        </p:sp>
+        <p:sp>
+          <p:nvSpPr>
+            <p:cNvPr id="30" name="직사각형 29"/>
+            <p:cNvSpPr/>
+            <p:nvPr/>
+          </p:nvSpPr>
+          <p:spPr>
+            <a:xfrm>
+              <a:off x="7766505" y="252872"/>
+              <a:ext cx="3504486" cy="5386090"/>
+            </a:xfrm>
+            <a:prstGeom prst="rect">
+              <a:avLst/>
+            </a:prstGeom>
+            <a:noFill/>
+          </p:spPr>
+          <p:txBody>
+            <a:bodyPr wrap="none" lIns="91440" tIns="45720" rIns="91440" bIns="45720">
+              <a:spAutoFit/>
+            </a:bodyPr>
+            <a:lstStyle/>
+            <a:p>
+              <a:pPr algn="ctr"/>
+              <a:r>
+                <a:rPr lang="en-US" altLang="ko-KR" sz="34400" b="1" dirty="0">
+                  <a:ln w="13462">
+                    <a:solidFill>
+                      <a:schemeClr val="bg1"/>
+                    </a:solidFill>
+                    <a:prstDash val="solid"/>
+                  </a:ln>
+                  <a:solidFill>
+                    <a:schemeClr val="bg1">
+                      <a:lumMod val="85000"/>
+                    </a:schemeClr>
+                  </a:solidFill>
+                  <a:effectLst>
+                    <a:outerShdw dist="38100" dir="2700000" algn="bl" rotWithShape="0">
+                      <a:schemeClr val="accent5"/>
+                    </a:outerShdw>
+                  </a:effectLst>
+                  <a:latin typeface="Bauhaus 93" panose="04030905020B02020C02" pitchFamily="82" charset="0"/>
+                </a:rPr>
+                <a:t>C</a:t>
+              </a:r>
+              <a:endParaRPr lang="en-US" altLang="ko-KR" sz="34400" b="1" cap="none" spc="0" dirty="0">
+                <a:ln w="12700">
+                  <a:solidFill>
+                    <a:schemeClr val="tx2">
+                      <a:lumMod val="75000"/>
+                    </a:schemeClr>
+                  </a:solidFill>
+                  <a:prstDash val="solid"/>
+                </a:ln>
+                <a:solidFill>
+                  <a:schemeClr val="bg1">
+                    <a:lumMod val="85000"/>
+                  </a:schemeClr>
+                </a:solidFill>
+                <a:effectLst>
+                  <a:outerShdw dist="38100" dir="2640000" algn="bl" rotWithShape="0">
+                    <a:schemeClr val="tx2">
+                      <a:lumMod val="75000"/>
+                    </a:schemeClr>
+                  </a:outerShdw>
+                </a:effectLst>
+                <a:latin typeface="Bauhaus 93" panose="04030905020B02020C02" pitchFamily="82" charset="0"/>
+              </a:endParaRPr>
+            </a:p>
+          </p:txBody>
+        </p:sp>
+        <p:sp>
+          <p:nvSpPr>
+            <p:cNvPr id="34" name="직사각형 33"/>
+            <p:cNvSpPr/>
+            <p:nvPr/>
+          </p:nvSpPr>
+          <p:spPr>
+            <a:xfrm rot="10800000">
+              <a:off x="8130671" y="5308085"/>
+              <a:ext cx="2810906" cy="110528"/>
+            </a:xfrm>
+            <a:prstGeom prst="rect">
+              <a:avLst/>
+            </a:prstGeom>
+            <a:gradFill flip="none" rotWithShape="1">
+              <a:gsLst>
+                <a:gs pos="0">
+                  <a:srgbClr val="737373"/>
+                </a:gs>
+                <a:gs pos="100000">
+                  <a:srgbClr val="DCDCDC"/>
+                </a:gs>
+              </a:gsLst>
+              <a:lin ang="5400000" scaled="1"/>
+              <a:tileRect/>
+            </a:gradFill>
+            <a:ln>
+              <a:noFill/>
+            </a:ln>
+          </p:spPr>
+          <p:style>
+            <a:lnRef idx="2">
+              <a:schemeClr val="accent1">
+                <a:shade val="50000"/>
+              </a:schemeClr>
+            </a:lnRef>
+            <a:fillRef idx="1">
+              <a:schemeClr val="accent1"/>
+            </a:fillRef>
+            <a:effectRef idx="0">
+              <a:schemeClr val="accent1"/>
+            </a:effectRef>
+            <a:fontRef idx="minor">
+              <a:schemeClr val="lt1"/>
+            </a:fontRef>
+          </p:style>
+          <p:txBody>
+            <a:bodyPr rtlCol="0" anchor="ctr"/>
+            <a:lstStyle/>
+            <a:p>
+              <a:pPr algn="ctr"/>
+              <a:endParaRPr lang="ko-KR" altLang="en-US"/>
+            </a:p>
+          </p:txBody>
+        </p:sp>
+        <p:sp>
+          <p:nvSpPr>
+            <p:cNvPr id="35" name="직사각형 34"/>
+            <p:cNvSpPr/>
+            <p:nvPr/>
+          </p:nvSpPr>
+          <p:spPr>
+            <a:xfrm rot="7200000">
+              <a:off x="10227079" y="4170153"/>
+              <a:ext cx="2689683" cy="110528"/>
+            </a:xfrm>
+            <a:prstGeom prst="rect">
+              <a:avLst/>
+            </a:prstGeom>
+            <a:gradFill flip="none" rotWithShape="1">
+              <a:gsLst>
+                <a:gs pos="0">
+                  <a:srgbClr val="737373"/>
+                </a:gs>
+                <a:gs pos="100000">
+                  <a:srgbClr val="DCDCDC"/>
+                </a:gs>
+              </a:gsLst>
+              <a:lin ang="5400000" scaled="1"/>
+              <a:tileRect/>
+            </a:gradFill>
+            <a:ln>
+              <a:noFill/>
+            </a:ln>
+          </p:spPr>
+          <p:style>
+            <a:lnRef idx="2">
+              <a:schemeClr val="accent1">
+                <a:shade val="50000"/>
+              </a:schemeClr>
+            </a:lnRef>
+            <a:fillRef idx="1">
+              <a:schemeClr val="accent1"/>
+            </a:fillRef>
+            <a:effectRef idx="0">
+              <a:schemeClr val="accent1"/>
+            </a:effectRef>
+            <a:fontRef idx="minor">
+              <a:schemeClr val="lt1"/>
+            </a:fontRef>
+          </p:style>
+          <p:txBody>
+            <a:bodyPr rtlCol="0" anchor="ctr"/>
+            <a:lstStyle/>
+            <a:p>
+              <a:pPr algn="ctr"/>
+              <a:endParaRPr lang="ko-KR" altLang="en-US"/>
+            </a:p>
+          </p:txBody>
+        </p:sp>
+        <p:sp>
+          <p:nvSpPr>
+            <p:cNvPr id="36" name="직사각형 35"/>
+            <p:cNvSpPr/>
+            <p:nvPr/>
+          </p:nvSpPr>
+          <p:spPr>
+            <a:xfrm rot="10800000">
+              <a:off x="8126211" y="5307188"/>
+              <a:ext cx="2810906" cy="110528"/>
+            </a:xfrm>
+            <a:prstGeom prst="rect">
+              <a:avLst/>
+            </a:prstGeom>
+            <a:gradFill flip="none" rotWithShape="1">
+              <a:gsLst>
+                <a:gs pos="0">
+                  <a:srgbClr val="737373"/>
+                </a:gs>
+                <a:gs pos="100000">
+                  <a:srgbClr val="DCDCDC"/>
+                </a:gs>
+              </a:gsLst>
+              <a:lin ang="5400000" scaled="1"/>
+              <a:tileRect/>
+            </a:gradFill>
+            <a:ln>
+              <a:noFill/>
+            </a:ln>
+          </p:spPr>
+          <p:style>
+            <a:lnRef idx="2">
+              <a:schemeClr val="accent1">
+                <a:shade val="50000"/>
+              </a:schemeClr>
+            </a:lnRef>
+            <a:fillRef idx="1">
+              <a:schemeClr val="accent1"/>
+            </a:fillRef>
+            <a:effectRef idx="0">
+              <a:schemeClr val="accent1"/>
+            </a:effectRef>
+            <a:fontRef idx="minor">
+              <a:schemeClr val="lt1"/>
+            </a:fontRef>
+          </p:style>
+          <p:txBody>
+            <a:bodyPr rtlCol="0" anchor="ctr"/>
+            <a:lstStyle/>
+            <a:p>
+              <a:pPr algn="ctr"/>
+              <a:endParaRPr lang="ko-KR" altLang="en-US"/>
+            </a:p>
+          </p:txBody>
+        </p:sp>
+        <p:sp>
+          <p:nvSpPr>
+            <p:cNvPr id="38" name="직사각형 37"/>
+            <p:cNvSpPr/>
+            <p:nvPr/>
+          </p:nvSpPr>
+          <p:spPr>
+            <a:xfrm rot="3600000">
+              <a:off x="10210520" y="1886955"/>
+              <a:ext cx="2722800" cy="110528"/>
+            </a:xfrm>
+            <a:prstGeom prst="rect">
+              <a:avLst/>
+            </a:prstGeom>
+            <a:gradFill flip="none" rotWithShape="1">
+              <a:gsLst>
+                <a:gs pos="0">
+                  <a:srgbClr val="737373"/>
+                </a:gs>
+                <a:gs pos="100000">
+                  <a:srgbClr val="DCDCDC"/>
+                </a:gs>
+              </a:gsLst>
+              <a:lin ang="5400000" scaled="1"/>
+              <a:tileRect/>
+            </a:gradFill>
+            <a:ln>
+              <a:noFill/>
+            </a:ln>
+          </p:spPr>
+          <p:style>
+            <a:lnRef idx="2">
+              <a:schemeClr val="accent1">
+                <a:shade val="50000"/>
+              </a:schemeClr>
+            </a:lnRef>
+            <a:fillRef idx="1">
+              <a:schemeClr val="accent1"/>
+            </a:fillRef>
+            <a:effectRef idx="0">
+              <a:schemeClr val="accent1"/>
+            </a:effectRef>
+            <a:fontRef idx="minor">
+              <a:schemeClr val="lt1"/>
+            </a:fontRef>
+          </p:style>
+          <p:txBody>
+            <a:bodyPr rtlCol="0" anchor="ctr"/>
+            <a:lstStyle/>
+            <a:p>
+              <a:pPr algn="ctr"/>
+              <a:endParaRPr lang="ko-KR" altLang="en-US"/>
+            </a:p>
+          </p:txBody>
+        </p:sp>
+        <p:sp>
+          <p:nvSpPr>
+            <p:cNvPr id="39" name="직사각형 38"/>
+            <p:cNvSpPr/>
+            <p:nvPr/>
+          </p:nvSpPr>
+          <p:spPr>
+            <a:xfrm rot="14400000">
+              <a:off x="6171693" y="4166284"/>
+              <a:ext cx="2700692" cy="110528"/>
+            </a:xfrm>
+            <a:prstGeom prst="rect">
+              <a:avLst/>
+            </a:prstGeom>
+            <a:gradFill flip="none" rotWithShape="1">
+              <a:gsLst>
+                <a:gs pos="0">
+                  <a:srgbClr val="737373"/>
+                </a:gs>
+                <a:gs pos="100000">
+                  <a:srgbClr val="DCDCDC"/>
+                </a:gs>
+              </a:gsLst>
+              <a:lin ang="5400000" scaled="1"/>
+              <a:tileRect/>
+            </a:gradFill>
+            <a:ln>
+              <a:noFill/>
+            </a:ln>
+          </p:spPr>
+          <p:style>
+            <a:lnRef idx="2">
+              <a:schemeClr val="accent1">
+                <a:shade val="50000"/>
+              </a:schemeClr>
+            </a:lnRef>
+            <a:fillRef idx="1">
+              <a:schemeClr val="accent1"/>
+            </a:fillRef>
+            <a:effectRef idx="0">
+              <a:schemeClr val="accent1"/>
+            </a:effectRef>
+            <a:fontRef idx="minor">
+              <a:schemeClr val="lt1"/>
+            </a:fontRef>
+          </p:style>
+          <p:txBody>
+            <a:bodyPr rtlCol="0" anchor="ctr"/>
+            <a:lstStyle/>
+            <a:p>
+              <a:pPr algn="ctr"/>
+              <a:endParaRPr lang="ko-KR" altLang="en-US"/>
+            </a:p>
+          </p:txBody>
+        </p:sp>
+        <p:sp>
+          <p:nvSpPr>
+            <p:cNvPr id="40" name="직사각형 39"/>
+            <p:cNvSpPr/>
+            <p:nvPr/>
+          </p:nvSpPr>
+          <p:spPr>
+            <a:xfrm>
+              <a:off x="8138763" y="734647"/>
+              <a:ext cx="2810906" cy="110528"/>
+            </a:xfrm>
+            <a:prstGeom prst="rect">
+              <a:avLst/>
+            </a:prstGeom>
+            <a:gradFill flip="none" rotWithShape="1">
+              <a:gsLst>
+                <a:gs pos="0">
+                  <a:srgbClr val="737373"/>
+                </a:gs>
+                <a:gs pos="100000">
+                  <a:srgbClr val="DCDCDC"/>
+                </a:gs>
+              </a:gsLst>
+              <a:lin ang="5400000" scaled="1"/>
+              <a:tileRect/>
+            </a:gradFill>
+            <a:ln>
+              <a:noFill/>
+            </a:ln>
+          </p:spPr>
+          <p:style>
+            <a:lnRef idx="2">
+              <a:schemeClr val="accent1">
+                <a:shade val="50000"/>
+              </a:schemeClr>
+            </a:lnRef>
+            <a:fillRef idx="1">
+              <a:schemeClr val="accent1"/>
+            </a:fillRef>
+            <a:effectRef idx="0">
+              <a:schemeClr val="accent1"/>
+            </a:effectRef>
+            <a:fontRef idx="minor">
+              <a:schemeClr val="lt1"/>
+            </a:fontRef>
+          </p:style>
+          <p:txBody>
+            <a:bodyPr rtlCol="0" anchor="ctr"/>
+            <a:lstStyle/>
+            <a:p>
+              <a:pPr algn="ctr"/>
+              <a:endParaRPr lang="ko-KR" altLang="en-US"/>
+            </a:p>
+          </p:txBody>
+        </p:sp>
+        <p:sp>
+          <p:nvSpPr>
+            <p:cNvPr id="41" name="직사각형 40"/>
+            <p:cNvSpPr/>
+            <p:nvPr/>
+          </p:nvSpPr>
+          <p:spPr>
+            <a:xfrm rot="18000000">
+              <a:off x="6182333" y="1884257"/>
+              <a:ext cx="2695912" cy="110528"/>
+            </a:xfrm>
+            <a:prstGeom prst="rect">
+              <a:avLst/>
+            </a:prstGeom>
+            <a:gradFill flip="none" rotWithShape="1">
+              <a:gsLst>
+                <a:gs pos="0">
+                  <a:srgbClr val="737373"/>
+                </a:gs>
+                <a:gs pos="100000">
+                  <a:srgbClr val="DCDCDC"/>
                 </a:gs>
               </a:gsLst>
               <a:lin ang="5400000" scaled="1"/>
@@ -10566,7 +11088,7 @@
             <a:lstStyle/>
             <a:p>
               <a:pPr algn="ctr"/>
-              <a:endParaRPr lang="ko-KR" altLang="en-US"/>
+              <a:endParaRPr lang="ko-KR" altLang="en-US" dirty="0"/>
             </a:p>
           </p:txBody>
         </p:sp>

</xml_diff>